<commit_message>
Added "Managing Embedded Fonts" Example
</commit_message>
<xml_diff>
--- a/Examples/src/main/resources/com/aspose/slides/examples/Presentation/Creation/CreateAPresentation/HelloWorld.pptx
+++ b/Examples/src/main/resources/com/aspose/slides/examples/Presentation/Creation/CreateAPresentation/HelloWorld.pptx
@@ -1,6 +1,6 @@
 
 <file path=ppt/presentation.xml><?xml version="1.0" encoding="utf-8"?>
-<!--Generated by Aspose.Slides for Java 16.4.0.0-->
+<!--Generated by Aspose.Slides for Java 16.6.0.0-->
 <p:presentation xmlns:r="http://schemas.openxmlformats.org/officeDocument/2006/relationships" xmlns:a="http://schemas.openxmlformats.org/drawingml/2006/main" xmlns:p="http://schemas.openxmlformats.org/presentationml/2006/main" saveSubsetFonts="1">
   <p:sldMasterIdLst>
     <p:sldMasterId id="2147483648" r:id="rId1"/>
@@ -278,9 +278,9 @@
           <a:bodyPr/>
           <a:lstStyle/>
           <a:p>
-            <a:fld id="{E8FD0B7A-F5DD-4F40-B4CB-3B2C354B893A}" type="datetimeFigureOut">
-              <a:rPr lang="en-US" smtClean="0" smtId="4294967295"/>
-              <a:t>Date</a:t>
+            <a:fld id="{396BED75-22EB-49EB-AEC5-85730E8FF021}" type="datetimeFigureOut">
+              <a:rPr lang="en-US" smtClean="0" smtId="4294967295"/>
+              <a:t>11/7/2009</a:t>
             </a:fld>
             <a:endParaRPr lang="en-US" smtId="4294967295"/>
           </a:p>
@@ -442,9 +442,9 @@
           <a:bodyPr/>
           <a:lstStyle/>
           <a:p>
-            <a:fld id="{E8FD0B7A-F5DD-4F40-B4CB-3B2C354B893A}" type="datetimeFigureOut">
-              <a:rPr lang="en-US" smtClean="0" smtId="4294967295"/>
-              <a:t>Date</a:t>
+            <a:fld id="{C3A5B230-B4E9-44ED-A81B-47692242177D}" type="datetimeFigureOut">
+              <a:rPr lang="en-US" smtClean="0" smtId="4294967295"/>
+              <a:t>11/7/2009</a:t>
             </a:fld>
             <a:endParaRPr lang="en-US" smtId="4294967295"/>
           </a:p>
@@ -606,9 +606,9 @@
           <a:bodyPr/>
           <a:lstStyle/>
           <a:p>
-            <a:fld id="{E8FD0B7A-F5DD-4F40-B4CB-3B2C354B893A}" type="datetimeFigureOut">
-              <a:rPr lang="en-US" smtClean="0" smtId="4294967295"/>
-              <a:t>Date</a:t>
+            <a:fld id="{60FABED5-838B-4E19-82D3-465A09079BE0}" type="datetimeFigureOut">
+              <a:rPr lang="en-US" smtClean="0" smtId="4294967295"/>
+              <a:t>11/7/2009</a:t>
             </a:fld>
             <a:endParaRPr lang="en-US" smtId="4294967295"/>
           </a:p>
@@ -770,9 +770,9 @@
           <a:bodyPr/>
           <a:lstStyle/>
           <a:p>
-            <a:fld id="{E8FD0B7A-F5DD-4F40-B4CB-3B2C354B893A}" type="datetimeFigureOut">
-              <a:rPr lang="en-US" smtClean="0" smtId="4294967295"/>
-              <a:t>Date</a:t>
+            <a:fld id="{12B10730-E4D3-41DD-B400-316C3A0AEA70}" type="datetimeFigureOut">
+              <a:rPr lang="en-US" smtClean="0" smtId="4294967295"/>
+              <a:t>11/7/2009</a:t>
             </a:fld>
             <a:endParaRPr lang="en-US" smtId="4294967295"/>
           </a:p>
@@ -1000,9 +1000,9 @@
           <a:bodyPr/>
           <a:lstStyle/>
           <a:p>
-            <a:fld id="{E8FD0B7A-F5DD-4F40-B4CB-3B2C354B893A}" type="datetimeFigureOut">
-              <a:rPr lang="en-US" smtClean="0" smtId="4294967295"/>
-              <a:t>Date</a:t>
+            <a:fld id="{06005972-9705-491F-95AE-BE2F9C2FE600}" type="datetimeFigureOut">
+              <a:rPr lang="en-US" smtClean="0" smtId="4294967295"/>
+              <a:t>11/7/2009</a:t>
             </a:fld>
             <a:endParaRPr lang="en-US" smtId="4294967295"/>
           </a:p>
@@ -1271,9 +1271,9 @@
           <a:bodyPr/>
           <a:lstStyle/>
           <a:p>
-            <a:fld id="{E8FD0B7A-F5DD-4F40-B4CB-3B2C354B893A}" type="datetimeFigureOut">
-              <a:rPr lang="en-US" smtClean="0" smtId="4294967295"/>
-              <a:t>Date</a:t>
+            <a:fld id="{479AEEE9-5B65-4CF4-BD33-39ED3AD00BDF}" type="datetimeFigureOut">
+              <a:rPr lang="en-US" smtClean="0" smtId="4294967295"/>
+              <a:t>11/7/2009</a:t>
             </a:fld>
             <a:endParaRPr lang="en-US" smtId="4294967295"/>
           </a:p>
@@ -1660,9 +1660,9 @@
           <a:bodyPr/>
           <a:lstStyle/>
           <a:p>
-            <a:fld id="{E8FD0B7A-F5DD-4F40-B4CB-3B2C354B893A}" type="datetimeFigureOut">
-              <a:rPr lang="en-US" smtClean="0" smtId="4294967295"/>
-              <a:t>Date</a:t>
+            <a:fld id="{2D4B0A71-0FD5-4B6F-8782-E93956C59DEF}" type="datetimeFigureOut">
+              <a:rPr lang="en-US" smtClean="0" smtId="4294967295"/>
+              <a:t>11/7/2009</a:t>
             </a:fld>
             <a:endParaRPr lang="en-US" smtId="4294967295"/>
           </a:p>
@@ -1773,9 +1773,9 @@
           <a:bodyPr/>
           <a:lstStyle/>
           <a:p>
-            <a:fld id="{E8FD0B7A-F5DD-4F40-B4CB-3B2C354B893A}" type="datetimeFigureOut">
-              <a:rPr lang="en-US" smtClean="0" smtId="4294967295"/>
-              <a:t>Date</a:t>
+            <a:fld id="{4A14DAB0-9E94-4F89-AE8D-AB3F6F1D61FD}" type="datetimeFigureOut">
+              <a:rPr lang="en-US" smtClean="0" smtId="4294967295"/>
+              <a:t>11/7/2009</a:t>
             </a:fld>
             <a:endParaRPr lang="en-US" smtId="4294967295"/>
           </a:p>
@@ -1863,9 +1863,9 @@
           <a:bodyPr/>
           <a:lstStyle/>
           <a:p>
-            <a:fld id="{E8FD0B7A-F5DD-4F40-B4CB-3B2C354B893A}" type="datetimeFigureOut">
-              <a:rPr lang="en-US" smtClean="0" smtId="4294967295"/>
-              <a:t>Date</a:t>
+            <a:fld id="{00B9BA45-C8D2-4623-AB48-2D6AEA4D8F12}" type="datetimeFigureOut">
+              <a:rPr lang="en-US" smtClean="0" smtId="4294967295"/>
+              <a:t>11/7/2009</a:t>
             </a:fld>
             <a:endParaRPr lang="en-US" smtId="4294967295"/>
           </a:p>
@@ -2118,9 +2118,9 @@
           <a:bodyPr/>
           <a:lstStyle/>
           <a:p>
-            <a:fld id="{E8FD0B7A-F5DD-4F40-B4CB-3B2C354B893A}" type="datetimeFigureOut">
-              <a:rPr lang="en-US" smtClean="0" smtId="4294967295"/>
-              <a:t>Date</a:t>
+            <a:fld id="{A64F4F1E-D2AB-43CC-B14A-864C175AAAD3}" type="datetimeFigureOut">
+              <a:rPr lang="en-US" smtClean="0" smtId="4294967295"/>
+              <a:t>11/7/2009</a:t>
             </a:fld>
             <a:endParaRPr lang="en-US" smtId="4294967295"/>
           </a:p>
@@ -2350,9 +2350,9 @@
           <a:bodyPr/>
           <a:lstStyle/>
           <a:p>
-            <a:fld id="{E8FD0B7A-F5DD-4F40-B4CB-3B2C354B893A}" type="datetimeFigureOut">
-              <a:rPr lang="en-US" smtClean="0" smtId="4294967295"/>
-              <a:t>Date</a:t>
+            <a:fld id="{DE3C0E3C-30B9-4253-B57C-176D221BAD6F}" type="datetimeFigureOut">
+              <a:rPr lang="en-US" smtClean="0" smtId="4294967295"/>
+              <a:t>11/7/2009</a:t>
             </a:fld>
             <a:endParaRPr lang="en-US" smtId="4294967295"/>
           </a:p>
@@ -3035,7 +3035,7 @@
           <a:p>
             <a:pPr algn="ctr"/>
             <a:r>
-              <a:t>Created with Aspose.Slides for Java 16.4.0.0.</a:t>
+              <a:t>Created with Aspose.Slides for Java 16.6.0.0.</a:t>
             </a:r>
           </a:p>
           <a:p>
@@ -3059,9 +3059,9 @@
 <file path=ppt/tags/tag1.xml><?xml version="1.0" encoding="utf-8"?>
 <p:tagLst xmlns:p="http://schemas.openxmlformats.org/presentationml/2006/main">
   <p:tag name="AS_OS" val="Mac OS X 10.11 unknown"/>
-  <p:tag name="AS_RELEASE_DATE" val="2016.05.16"/>
+  <p:tag name="AS_RELEASE_DATE" val="2016.07.16"/>
   <p:tag name="AS_TITLE" val="Aspose.Slides for Java"/>
-  <p:tag name="AS_VERSION" val="16.4.0.0"/>
+  <p:tag name="AS_VERSION" val="16.6.0.0"/>
 </p:tagLst>
 </file>
 
@@ -3205,7 +3205,6 @@
             </a:gs>
           </a:gsLst>
           <a:lin ang="16200000" scaled="1"/>
-          <a:tileRect/>
         </a:gradFill>
         <a:gradFill rotWithShape="1">
           <a:gsLst>
@@ -3229,7 +3228,6 @@
             </a:gs>
           </a:gsLst>
           <a:lin ang="16200000" scaled="0"/>
-          <a:tileRect/>
         </a:gradFill>
       </a:fillStyleLst>
       <a:lnStyleLst>
@@ -3324,7 +3322,6 @@
           <a:path path="circle">
             <a:fillToRect l="50000" t="-80000" r="50000" b="180000"/>
           </a:path>
-          <a:tileRect/>
         </a:gradFill>
         <a:gradFill rotWithShape="1">
           <a:gsLst>
@@ -3344,7 +3341,6 @@
           <a:path path="circle">
             <a:fillToRect l="50000" t="50000" r="50000" b="50000"/>
           </a:path>
-          <a:tileRect/>
         </a:gradFill>
       </a:bgFillStyleLst>
     </a:fmtScheme>

</xml_diff>